<commit_message>
Updating PPT & exercises
</commit_message>
<xml_diff>
--- a/Session I - Basic HTML + HTML5 elements/Session I - Basic HTML + HTML5.pptx
+++ b/Session I - Basic HTML + HTML5 elements/Session I - Basic HTML + HTML5.pptx
@@ -150,7 +150,7 @@
   </p:defaultTextStyle>
   <p:extLst>
     <p:ext uri="{EFAFB233-063F-42B5-8137-9DF3F51BA10A}">
-      <p15:sldGuideLst xmlns="" xmlns:p15="http://schemas.microsoft.com/office/powerpoint/2012/main"/>
+      <p15:sldGuideLst xmlns:p15="http://schemas.microsoft.com/office/powerpoint/2012/main" xmlns=""/>
     </p:ext>
   </p:extLst>
 </p:presentation>
@@ -22565,7 +22565,19 @@
               <a:rPr lang="en-US" dirty="0">
                 <a:latin typeface="Candara" panose="020E0502030303020204" pitchFamily="34" charset="0"/>
               </a:rPr>
-              <a:t>&gt;Hacking HTML&lt;/</a:t>
+              <a:t>&gt;Hacking </a:t>
+            </a:r>
+            <a:r>
+              <a:rPr lang="en-US" dirty="0" smtClean="0">
+                <a:latin typeface="Candara" panose="020E0502030303020204" pitchFamily="34" charset="0"/>
+              </a:rPr>
+              <a:t>HTML5&lt;</a:t>
+            </a:r>
+            <a:r>
+              <a:rPr lang="en-US" dirty="0">
+                <a:latin typeface="Candara" panose="020E0502030303020204" pitchFamily="34" charset="0"/>
+              </a:rPr>
+              <a:t>/</a:t>
             </a:r>
             <a:r>
               <a:rPr lang="en-US" b="1" dirty="0">
@@ -22677,7 +22689,19 @@
               <a:rPr lang="en-US" dirty="0">
                 <a:latin typeface="Candara" panose="020E0502030303020204" pitchFamily="34" charset="0"/>
               </a:rPr>
-              <a:t>Hacking HTML&lt;/</a:t>
+              <a:t>Hacking </a:t>
+            </a:r>
+            <a:r>
+              <a:rPr lang="en-US" dirty="0" smtClean="0">
+                <a:latin typeface="Candara" panose="020E0502030303020204" pitchFamily="34" charset="0"/>
+              </a:rPr>
+              <a:t>HTML5&lt;</a:t>
+            </a:r>
+            <a:r>
+              <a:rPr lang="en-US" dirty="0">
+                <a:latin typeface="Candara" panose="020E0502030303020204" pitchFamily="34" charset="0"/>
+              </a:rPr>
+              <a:t>/</a:t>
             </a:r>
             <a:r>
               <a:rPr lang="en-US" b="1" dirty="0">
@@ -22870,7 +22894,7 @@
         <p:spPr>
           <a:xfrm>
             <a:off x="76200" y="914401"/>
-            <a:ext cx="3124200" cy="5509200"/>
+            <a:ext cx="3124200" cy="5468165"/>
           </a:xfrm>
           <a:prstGeom prst="rect">
             <a:avLst/>
@@ -22963,35 +22987,26 @@
               </a:lnSpc>
             </a:pPr>
             <a:r>
+              <a:rPr lang="en-US" sz="1600" dirty="0" smtClean="0">
+                <a:latin typeface="Candara" panose="020E0502030303020204" pitchFamily="34" charset="0"/>
+              </a:rPr>
+              <a:t>&lt;</a:t>
+            </a:r>
+            <a:r>
+              <a:rPr lang="en-US" sz="1600" b="1" dirty="0">
+                <a:latin typeface="Candara" panose="020E0502030303020204" pitchFamily="34" charset="0"/>
+              </a:rPr>
+              <a:t>meta</a:t>
+            </a:r>
+            <a:r>
               <a:rPr lang="en-US" sz="1600" dirty="0">
                 <a:latin typeface="Candara" panose="020E0502030303020204" pitchFamily="34" charset="0"/>
               </a:rPr>
-              <a:t>&lt;</a:t>
-            </a:r>
-            <a:r>
-              <a:rPr lang="en-US" sz="1600" b="1" dirty="0">
-                <a:latin typeface="Candara" panose="020E0502030303020204" pitchFamily="34" charset="0"/>
-              </a:rPr>
-              <a:t>title</a:t>
-            </a:r>
-            <a:r>
-              <a:rPr lang="en-US" sz="1600" dirty="0">
-                <a:latin typeface="Candara" panose="020E0502030303020204" pitchFamily="34" charset="0"/>
-              </a:rPr>
-              <a:t>&gt;Hacking HTML&lt;/</a:t>
-            </a:r>
-            <a:r>
-              <a:rPr lang="en-US" sz="1600" b="1" dirty="0">
-                <a:latin typeface="Candara" panose="020E0502030303020204" pitchFamily="34" charset="0"/>
-              </a:rPr>
-              <a:t>title</a:t>
-            </a:r>
-            <a:r>
-              <a:rPr lang="en-US" sz="1600" dirty="0">
-                <a:latin typeface="Candara" panose="020E0502030303020204" pitchFamily="34" charset="0"/>
-              </a:rPr>
-              <a:t>&gt; </a:t>
-            </a:r>
+              <a:t> charset="utf-8" /&gt; </a:t>
+            </a:r>
+            <a:endParaRPr lang="en-US" sz="1600" dirty="0" smtClean="0">
+              <a:latin typeface="Candara" panose="020E0502030303020204" pitchFamily="34" charset="0"/>
+            </a:endParaRPr>
           </a:p>
           <a:p>
             <a:pPr>
@@ -23009,14 +23024,29 @@
               <a:rPr lang="en-US" sz="1600" b="1" dirty="0">
                 <a:latin typeface="Candara" panose="020E0502030303020204" pitchFamily="34" charset="0"/>
               </a:rPr>
-              <a:t>meta</a:t>
+              <a:t>title</a:t>
             </a:r>
             <a:r>
               <a:rPr lang="en-US" sz="1600" dirty="0">
                 <a:latin typeface="Candara" panose="020E0502030303020204" pitchFamily="34" charset="0"/>
               </a:rPr>
-              <a:t> charset="utf-8" /&gt; </a:t>
-            </a:r>
+              <a:t>&gt;Hacking HTML5&lt;/</a:t>
+            </a:r>
+            <a:r>
+              <a:rPr lang="en-US" sz="1600" b="1" dirty="0">
+                <a:latin typeface="Candara" panose="020E0502030303020204" pitchFamily="34" charset="0"/>
+              </a:rPr>
+              <a:t>title</a:t>
+            </a:r>
+            <a:r>
+              <a:rPr lang="en-US" sz="1600" dirty="0">
+                <a:latin typeface="Candara" panose="020E0502030303020204" pitchFamily="34" charset="0"/>
+              </a:rPr>
+              <a:t>&gt; </a:t>
+            </a:r>
+            <a:endParaRPr lang="en-US" sz="1600" dirty="0">
+              <a:latin typeface="Candara" panose="020E0502030303020204" pitchFamily="34" charset="0"/>
+            </a:endParaRPr>
           </a:p>
           <a:p>
             <a:pPr>
@@ -23090,7 +23120,19 @@
               <a:rPr lang="en-US" sz="1600" dirty="0">
                 <a:latin typeface="Candara" panose="020E0502030303020204" pitchFamily="34" charset="0"/>
               </a:rPr>
-              <a:t>&gt;Hacking HTML&lt;/</a:t>
+              <a:t>&gt;Hacking </a:t>
+            </a:r>
+            <a:r>
+              <a:rPr lang="en-US" sz="1600" dirty="0" smtClean="0">
+                <a:latin typeface="Candara" panose="020E0502030303020204" pitchFamily="34" charset="0"/>
+              </a:rPr>
+              <a:t>HTML5&lt;</a:t>
+            </a:r>
+            <a:r>
+              <a:rPr lang="en-US" sz="1600" dirty="0">
+                <a:latin typeface="Candara" panose="020E0502030303020204" pitchFamily="34" charset="0"/>
+              </a:rPr>
+              <a:t>/</a:t>
             </a:r>
             <a:r>
               <a:rPr lang="en-US" sz="1600" b="1" dirty="0">
@@ -23308,13 +23350,31 @@
               <a:buChar char="•"/>
             </a:pPr>
             <a:r>
+              <a:rPr lang="en-US" sz="1400" b="1" dirty="0" smtClean="0">
+                <a:solidFill>
+                  <a:srgbClr val="C0504D"/>
+                </a:solidFill>
+                <a:latin typeface="Candara" panose="020E0502030303020204" pitchFamily="34" charset="0"/>
+              </a:rPr>
+              <a:t>&lt;</a:t>
+            </a:r>
+            <a:r>
               <a:rPr lang="en-US" sz="1400" b="1" dirty="0">
                 <a:solidFill>
                   <a:srgbClr val="C0504D"/>
                 </a:solidFill>
                 <a:latin typeface="Candara" panose="020E0502030303020204" pitchFamily="34" charset="0"/>
               </a:rPr>
-              <a:t>&lt;title&gt; </a:t>
+              <a:t>meta&gt;</a:t>
+            </a:r>
+            <a:r>
+              <a:rPr lang="en-US" sz="1400" dirty="0">
+                <a:solidFill>
+                  <a:srgbClr val="C0504D"/>
+                </a:solidFill>
+                <a:latin typeface="Candara" panose="020E0502030303020204" pitchFamily="34" charset="0"/>
+              </a:rPr>
+              <a:t> </a:t>
             </a:r>
             <a:r>
               <a:rPr lang="en-US" sz="1400" dirty="0">
@@ -23326,7 +23386,19 @@
                 </a:solidFill>
                 <a:latin typeface="Candara" panose="020E0502030303020204" pitchFamily="34" charset="0"/>
               </a:rPr>
-              <a:t>tag defines the Page title displayed on the browser tab</a:t>
+              <a:t>tag is an instructional tag which defines metadata – static description like author, etc. ; how the browser should behave when displaying the page. In this example we set character encoding for the page content</a:t>
+            </a:r>
+            <a:r>
+              <a:rPr lang="en-US" sz="1400" dirty="0" smtClean="0">
+                <a:solidFill>
+                  <a:schemeClr val="tx1">
+                    <a:lumMod val="65000"/>
+                    <a:lumOff val="35000"/>
+                  </a:schemeClr>
+                </a:solidFill>
+                <a:latin typeface="Candara" panose="020E0502030303020204" pitchFamily="34" charset="0"/>
+              </a:rPr>
+              <a:t>.</a:t>
             </a:r>
           </a:p>
           <a:p>
@@ -23341,16 +23413,7 @@
                 </a:solidFill>
                 <a:latin typeface="Candara" panose="020E0502030303020204" pitchFamily="34" charset="0"/>
               </a:rPr>
-              <a:t>&lt;meta&gt;</a:t>
-            </a:r>
-            <a:r>
-              <a:rPr lang="en-US" sz="1400" dirty="0">
-                <a:solidFill>
-                  <a:srgbClr val="C0504D"/>
-                </a:solidFill>
-                <a:latin typeface="Candara" panose="020E0502030303020204" pitchFamily="34" charset="0"/>
-              </a:rPr>
-              <a:t> </a:t>
+              <a:t>&lt;title&gt; </a:t>
             </a:r>
             <a:r>
               <a:rPr lang="en-US" sz="1400" dirty="0">
@@ -23362,8 +23425,29 @@
                 </a:solidFill>
                 <a:latin typeface="Candara" panose="020E0502030303020204" pitchFamily="34" charset="0"/>
               </a:rPr>
-              <a:t>tag is an instructional tag which defines metadata – static description like author, etc. ; how the browser should behave when displaying the page. In this example we set character encoding for the page content.</a:t>
-            </a:r>
+              <a:t>tag defines the Page title displayed on the browser </a:t>
+            </a:r>
+            <a:r>
+              <a:rPr lang="en-US" sz="1400" dirty="0" smtClean="0">
+                <a:solidFill>
+                  <a:schemeClr val="tx1">
+                    <a:lumMod val="65000"/>
+                    <a:lumOff val="35000"/>
+                  </a:schemeClr>
+                </a:solidFill>
+                <a:latin typeface="Candara" panose="020E0502030303020204" pitchFamily="34" charset="0"/>
+              </a:rPr>
+              <a:t>tab</a:t>
+            </a:r>
+            <a:endParaRPr lang="en-US" sz="1400" dirty="0">
+              <a:solidFill>
+                <a:schemeClr val="tx1">
+                  <a:lumMod val="65000"/>
+                  <a:lumOff val="35000"/>
+                </a:schemeClr>
+              </a:solidFill>
+              <a:latin typeface="Candara" panose="020E0502030303020204" pitchFamily="34" charset="0"/>
+            </a:endParaRPr>
           </a:p>
         </p:txBody>
       </p:sp>
@@ -25181,7 +25265,7 @@
             <a:avLst/>
           </a:prstGeom>
           <a:solidFill>
-            <a:srgbClr val="00B0F0"/>
+            <a:srgbClr val="4BACC6"/>
           </a:solidFill>
         </p:spPr>
         <p:txBody>
@@ -26994,7 +27078,7 @@
   <a:extraClrSchemeLst/>
   <a:extLst>
     <a:ext uri="{05A4C25C-085E-4340-85A3-A5531E510DB2}">
-      <thm15:themeFamily xmlns="" xmlns:thm15="http://schemas.microsoft.com/office/thememl/2012/main" name="Office Theme" id="{62F939B6-93AF-4DB8-9C6B-D6C7DFDC589F}" vid="{4A3C46E8-61CC-4603-A589-7422A47A8E4A}"/>
+      <thm15:themeFamily xmlns:thm15="http://schemas.microsoft.com/office/thememl/2012/main" xmlns="" name="Office Theme" id="{62F939B6-93AF-4DB8-9C6B-D6C7DFDC589F}" vid="{4A3C46E8-61CC-4603-A589-7422A47A8E4A}"/>
     </a:ext>
   </a:extLst>
 </a:theme>
@@ -27255,7 +27339,7 @@
   <a:extraClrSchemeLst/>
   <a:extLst>
     <a:ext uri="{05A4C25C-085E-4340-85A3-A5531E510DB2}">
-      <thm15:themeFamily xmlns="" xmlns:thm15="http://schemas.microsoft.com/office/thememl/2012/main" name="Office Theme" id="{62F939B6-93AF-4DB8-9C6B-D6C7DFDC589F}" vid="{4A3C46E8-61CC-4603-A589-7422A47A8E4A}"/>
+      <thm15:themeFamily xmlns:thm15="http://schemas.microsoft.com/office/thememl/2012/main" xmlns="" name="Office Theme" id="{62F939B6-93AF-4DB8-9C6B-D6C7DFDC589F}" vid="{4A3C46E8-61CC-4603-A589-7422A47A8E4A}"/>
     </a:ext>
   </a:extLst>
 </a:theme>

</xml_diff>